<commit_message>
DFD Level 2 update
</commit_message>
<xml_diff>
--- a/Second Review.pptx
+++ b/Second Review.pptx
@@ -15,6 +15,9 @@
     <p:sldId id="279" r:id="rId9"/>
     <p:sldId id="278" r:id="rId10"/>
     <p:sldId id="282" r:id="rId11"/>
+    <p:sldId id="283" r:id="rId12"/>
+    <p:sldId id="285" r:id="rId13"/>
+    <p:sldId id="284" r:id="rId14"/>
   </p:sldIdLst>
   <p:sldSz cx="12192000" cy="6858000"/>
   <p:notesSz cx="6858000" cy="9144000"/>
@@ -3811,6 +3814,131 @@
           </a:p>
         </p:txBody>
       </p:sp>
+      <p:sp>
+        <p:nvSpPr>
+          <p:cNvPr id="6" name="Rectangle: Rounded Corners 5">
+            <a:extLst>
+              <a:ext uri="{FF2B5EF4-FFF2-40B4-BE49-F238E27FC236}">
+                <a16:creationId xmlns:a16="http://schemas.microsoft.com/office/drawing/2014/main" id="{43741546-0CA7-DFF3-A123-9E6B6A5CC7B8}"/>
+              </a:ext>
+            </a:extLst>
+          </p:cNvPr>
+          <p:cNvSpPr/>
+          <p:nvPr/>
+        </p:nvSpPr>
+        <p:spPr>
+          <a:xfrm>
+            <a:off x="4049173" y="5475063"/>
+            <a:ext cx="2315351" cy="646331"/>
+          </a:xfrm>
+          <a:prstGeom prst="roundRect">
+            <a:avLst/>
+          </a:prstGeom>
+          <a:solidFill>
+            <a:srgbClr val="C55A11"/>
+          </a:solidFill>
+          <a:ln>
+            <a:noFill/>
+          </a:ln>
+        </p:spPr>
+        <p:style>
+          <a:lnRef idx="2">
+            <a:schemeClr val="accent1">
+              <a:shade val="15000"/>
+            </a:schemeClr>
+          </a:lnRef>
+          <a:fillRef idx="1">
+            <a:schemeClr val="accent1"/>
+          </a:fillRef>
+          <a:effectRef idx="0">
+            <a:schemeClr val="accent1"/>
+          </a:effectRef>
+          <a:fontRef idx="minor">
+            <a:schemeClr val="lt1"/>
+          </a:fontRef>
+        </p:style>
+        <p:txBody>
+          <a:bodyPr rtlCol="0" anchor="ctr"/>
+          <a:lstStyle/>
+          <a:p>
+            <a:pPr algn="ctr"/>
+            <a:endParaRPr lang="en-IN"/>
+          </a:p>
+        </p:txBody>
+      </p:sp>
+      <p:sp>
+        <p:nvSpPr>
+          <p:cNvPr id="4" name="TextBox 3">
+            <a:extLst>
+              <a:ext uri="{FF2B5EF4-FFF2-40B4-BE49-F238E27FC236}">
+                <a16:creationId xmlns:a16="http://schemas.microsoft.com/office/drawing/2014/main" id="{8C4C26C1-A27B-F123-083A-22F174CB5B03}"/>
+              </a:ext>
+            </a:extLst>
+          </p:cNvPr>
+          <p:cNvSpPr txBox="1"/>
+          <p:nvPr/>
+        </p:nvSpPr>
+        <p:spPr>
+          <a:xfrm>
+            <a:off x="4049173" y="5475063"/>
+            <a:ext cx="2315351" cy="646331"/>
+          </a:xfrm>
+          <a:prstGeom prst="rect">
+            <a:avLst/>
+          </a:prstGeom>
+          <a:noFill/>
+        </p:spPr>
+        <p:txBody>
+          <a:bodyPr wrap="square" rtlCol="0">
+            <a:spAutoFit/>
+          </a:bodyPr>
+          <a:lstStyle>
+            <a:defPPr>
+              <a:defRPr lang="ko-KR"/>
+            </a:defPPr>
+            <a:lvl1pPr>
+              <a:lnSpc>
+                <a:spcPct val="150000"/>
+              </a:lnSpc>
+              <a:defRPr sz="1400">
+                <a:solidFill>
+                  <a:schemeClr val="accent2"/>
+                </a:solidFill>
+              </a:defRPr>
+            </a:lvl1pPr>
+          </a:lstStyle>
+          <a:p>
+            <a:pPr>
+              <a:lnSpc>
+                <a:spcPct val="100000"/>
+              </a:lnSpc>
+            </a:pPr>
+            <a:r>
+              <a:rPr lang="pt-BR" altLang="ko-KR" sz="1800" spc="300" dirty="0">
+                <a:solidFill>
+                  <a:schemeClr val="bg1"/>
+                </a:solidFill>
+              </a:rPr>
+              <a:t>Guided By</a:t>
+            </a:r>
+          </a:p>
+          <a:p>
+            <a:pPr>
+              <a:lnSpc>
+                <a:spcPct val="100000"/>
+              </a:lnSpc>
+            </a:pPr>
+            <a:r>
+              <a:rPr lang="pt-BR" altLang="ko-KR" sz="1800" b="1" spc="300" dirty="0">
+                <a:solidFill>
+                  <a:schemeClr val="bg1"/>
+                </a:solidFill>
+              </a:rPr>
+              <a:t>Ms. Zakiyya M A</a:t>
+            </a:r>
+          </a:p>
+        </p:txBody>
+      </p:sp>
     </p:spTree>
     <p:extLst>
       <p:ext uri="{BB962C8B-B14F-4D97-AF65-F5344CB8AC3E}">
@@ -9476,6 +9604,690 @@
     </mc:Choice>
     <mc:Fallback xmlns="">
       <p:transition spd="med">
+        <p:fade/>
+      </p:transition>
+    </mc:Fallback>
+  </mc:AlternateContent>
+</p:sld>
+</file>
+
+<file path=ppt/slides/slide11.xml><?xml version="1.0" encoding="utf-8"?>
+<p:sld xmlns:a="http://schemas.openxmlformats.org/drawingml/2006/main" xmlns:r="http://schemas.openxmlformats.org/officeDocument/2006/relationships" xmlns:p="http://schemas.openxmlformats.org/presentationml/2006/main">
+  <p:cSld>
+    <p:spTree>
+      <p:nvGrpSpPr>
+        <p:cNvPr id="1" name=""/>
+        <p:cNvGrpSpPr/>
+        <p:nvPr/>
+      </p:nvGrpSpPr>
+      <p:grpSpPr>
+        <a:xfrm>
+          <a:off x="0" y="0"/>
+          <a:ext cx="0" cy="0"/>
+          <a:chOff x="0" y="0"/>
+          <a:chExt cx="0" cy="0"/>
+        </a:xfrm>
+      </p:grpSpPr>
+      <p:pic>
+        <p:nvPicPr>
+          <p:cNvPr id="9" name="Picture Placeholder 8" descr="A group of fruits and vegetables&#10;&#10;Description automatically generated">
+            <a:extLst>
+              <a:ext uri="{FF2B5EF4-FFF2-40B4-BE49-F238E27FC236}">
+                <a16:creationId xmlns:a16="http://schemas.microsoft.com/office/drawing/2014/main" id="{566F1E99-3F75-AFCF-568C-89EBD77160D5}"/>
+              </a:ext>
+            </a:extLst>
+          </p:cNvPr>
+          <p:cNvPicPr>
+            <a:picLocks noGrp="1" noChangeAspect="1"/>
+          </p:cNvPicPr>
+          <p:nvPr>
+            <p:ph type="pic" sz="quarter" idx="12"/>
+          </p:nvPr>
+        </p:nvPicPr>
+        <p:blipFill>
+          <a:blip r:embed="rId2"/>
+          <a:srcRect t="32" b="32"/>
+          <a:stretch>
+            <a:fillRect/>
+          </a:stretch>
+        </p:blipFill>
+        <p:spPr/>
+      </p:pic>
+      <p:sp>
+        <p:nvSpPr>
+          <p:cNvPr id="45" name="직사각형 44">
+            <a:extLst>
+              <a:ext uri="{FF2B5EF4-FFF2-40B4-BE49-F238E27FC236}">
+                <a16:creationId xmlns:a16="http://schemas.microsoft.com/office/drawing/2014/main" id="{BBF6209E-429C-26A9-0851-E980B7171294}"/>
+              </a:ext>
+            </a:extLst>
+          </p:cNvPr>
+          <p:cNvSpPr/>
+          <p:nvPr/>
+        </p:nvSpPr>
+        <p:spPr>
+          <a:xfrm>
+            <a:off x="0" y="0"/>
+            <a:ext cx="12192000" cy="6858001"/>
+          </a:xfrm>
+          <a:prstGeom prst="rect">
+            <a:avLst/>
+          </a:prstGeom>
+          <a:solidFill>
+            <a:schemeClr val="tx1">
+              <a:alpha val="72138"/>
+            </a:schemeClr>
+          </a:solidFill>
+          <a:ln>
+            <a:noFill/>
+          </a:ln>
+        </p:spPr>
+        <p:style>
+          <a:lnRef idx="2">
+            <a:schemeClr val="accent1">
+              <a:shade val="50000"/>
+            </a:schemeClr>
+          </a:lnRef>
+          <a:fillRef idx="1">
+            <a:schemeClr val="accent1"/>
+          </a:fillRef>
+          <a:effectRef idx="0">
+            <a:schemeClr val="accent1"/>
+          </a:effectRef>
+          <a:fontRef idx="minor">
+            <a:schemeClr val="lt1"/>
+          </a:fontRef>
+        </p:style>
+        <p:txBody>
+          <a:bodyPr rtlCol="0" anchor="ctr"/>
+          <a:lstStyle/>
+          <a:p>
+            <a:pPr algn="ctr"/>
+            <a:endParaRPr kumimoji="1" lang="ko-Kore-KR" altLang="en-US" dirty="0"/>
+          </a:p>
+        </p:txBody>
+      </p:sp>
+      <p:sp>
+        <p:nvSpPr>
+          <p:cNvPr id="4" name="Rectangle 3">
+            <a:extLst>
+              <a:ext uri="{FF2B5EF4-FFF2-40B4-BE49-F238E27FC236}">
+                <a16:creationId xmlns:a16="http://schemas.microsoft.com/office/drawing/2014/main" id="{2D2BB4F1-A44C-7379-CB7C-417E8DAA09B6}"/>
+              </a:ext>
+            </a:extLst>
+          </p:cNvPr>
+          <p:cNvSpPr/>
+          <p:nvPr/>
+        </p:nvSpPr>
+        <p:spPr>
+          <a:xfrm>
+            <a:off x="0" y="3075516"/>
+            <a:ext cx="12192000" cy="706967"/>
+          </a:xfrm>
+          <a:prstGeom prst="rect">
+            <a:avLst/>
+          </a:prstGeom>
+          <a:solidFill>
+            <a:schemeClr val="accent2">
+              <a:lumMod val="75000"/>
+            </a:schemeClr>
+          </a:solidFill>
+          <a:ln>
+            <a:noFill/>
+          </a:ln>
+        </p:spPr>
+        <p:style>
+          <a:lnRef idx="2">
+            <a:schemeClr val="accent1">
+              <a:shade val="15000"/>
+            </a:schemeClr>
+          </a:lnRef>
+          <a:fillRef idx="1">
+            <a:schemeClr val="accent1"/>
+          </a:fillRef>
+          <a:effectRef idx="0">
+            <a:schemeClr val="accent1"/>
+          </a:effectRef>
+          <a:fontRef idx="minor">
+            <a:schemeClr val="lt1"/>
+          </a:fontRef>
+        </p:style>
+        <p:txBody>
+          <a:bodyPr rtlCol="0" anchor="ctr"/>
+          <a:lstStyle/>
+          <a:p>
+            <a:pPr algn="ctr"/>
+            <a:endParaRPr lang="en-IN"/>
+          </a:p>
+        </p:txBody>
+      </p:sp>
+      <p:sp>
+        <p:nvSpPr>
+          <p:cNvPr id="5" name="TextBox 4">
+            <a:extLst>
+              <a:ext uri="{FF2B5EF4-FFF2-40B4-BE49-F238E27FC236}">
+                <a16:creationId xmlns:a16="http://schemas.microsoft.com/office/drawing/2014/main" id="{56B9AA69-E72F-16F9-0D31-83433BC8E146}"/>
+              </a:ext>
+            </a:extLst>
+          </p:cNvPr>
+          <p:cNvSpPr txBox="1"/>
+          <p:nvPr/>
+        </p:nvSpPr>
+        <p:spPr>
+          <a:xfrm>
+            <a:off x="4422912" y="3136611"/>
+            <a:ext cx="3346175" cy="584775"/>
+          </a:xfrm>
+          <a:prstGeom prst="rect">
+            <a:avLst/>
+          </a:prstGeom>
+          <a:noFill/>
+        </p:spPr>
+        <p:txBody>
+          <a:bodyPr wrap="square" rtlCol="0">
+            <a:spAutoFit/>
+          </a:bodyPr>
+          <a:lstStyle/>
+          <a:p>
+            <a:pPr algn="ctr"/>
+            <a:r>
+              <a:rPr lang="en-IN" sz="3200" b="1" dirty="0">
+                <a:solidFill>
+                  <a:schemeClr val="bg1"/>
+                </a:solidFill>
+              </a:rPr>
+              <a:t>Questions?</a:t>
+            </a:r>
+          </a:p>
+        </p:txBody>
+      </p:sp>
+    </p:spTree>
+    <p:extLst>
+      <p:ext uri="{BB962C8B-B14F-4D97-AF65-F5344CB8AC3E}">
+        <p14:creationId xmlns:p14="http://schemas.microsoft.com/office/powerpoint/2010/main" val="2912644122"/>
+      </p:ext>
+    </p:extLst>
+  </p:cSld>
+  <p:clrMapOvr>
+    <a:masterClrMapping/>
+  </p:clrMapOvr>
+  <mc:AlternateContent xmlns:mc="http://schemas.openxmlformats.org/markup-compatibility/2006">
+    <mc:Choice xmlns:p159="http://schemas.microsoft.com/office/powerpoint/2015/09/main" Requires="p159">
+      <p:transition xmlns:p14="http://schemas.microsoft.com/office/powerpoint/2010/main" spd="slow" p14:dur="1500">
+        <p159:morph option="byObject"/>
+      </p:transition>
+    </mc:Choice>
+    <mc:Fallback>
+      <p:transition spd="slow">
+        <p:fade/>
+      </p:transition>
+    </mc:Fallback>
+  </mc:AlternateContent>
+  <p:timing>
+    <p:tnLst>
+      <p:par>
+        <p:cTn id="1" dur="indefinite" restart="never" nodeType="tmRoot">
+          <p:childTnLst>
+            <p:seq concurrent="1" nextAc="seek">
+              <p:cTn id="2" dur="indefinite" nodeType="mainSeq">
+                <p:childTnLst>
+                  <p:par>
+                    <p:cTn id="3" fill="hold">
+                      <p:stCondLst>
+                        <p:cond delay="indefinite"/>
+                      </p:stCondLst>
+                      <p:childTnLst>
+                        <p:par>
+                          <p:cTn id="4" fill="hold">
+                            <p:stCondLst>
+                              <p:cond delay="0"/>
+                            </p:stCondLst>
+                            <p:childTnLst>
+                              <p:par>
+                                <p:cTn id="5" presetID="10" presetClass="entr" presetSubtype="0" fill="hold" grpId="0" nodeType="clickEffect">
+                                  <p:stCondLst>
+                                    <p:cond delay="0"/>
+                                  </p:stCondLst>
+                                  <p:childTnLst>
+                                    <p:set>
+                                      <p:cBhvr>
+                                        <p:cTn id="6" dur="1" fill="hold">
+                                          <p:stCondLst>
+                                            <p:cond delay="0"/>
+                                          </p:stCondLst>
+                                        </p:cTn>
+                                        <p:tgtEl>
+                                          <p:spTgt spid="5"/>
+                                        </p:tgtEl>
+                                        <p:attrNameLst>
+                                          <p:attrName>style.visibility</p:attrName>
+                                        </p:attrNameLst>
+                                      </p:cBhvr>
+                                      <p:to>
+                                        <p:strVal val="visible"/>
+                                      </p:to>
+                                    </p:set>
+                                    <p:animEffect transition="in" filter="fade">
+                                      <p:cBhvr>
+                                        <p:cTn id="7" dur="500"/>
+                                        <p:tgtEl>
+                                          <p:spTgt spid="5"/>
+                                        </p:tgtEl>
+                                      </p:cBhvr>
+                                    </p:animEffect>
+                                  </p:childTnLst>
+                                </p:cTn>
+                              </p:par>
+                            </p:childTnLst>
+                          </p:cTn>
+                        </p:par>
+                      </p:childTnLst>
+                    </p:cTn>
+                  </p:par>
+                </p:childTnLst>
+              </p:cTn>
+              <p:prevCondLst>
+                <p:cond evt="onPrev" delay="0">
+                  <p:tgtEl>
+                    <p:sldTgt/>
+                  </p:tgtEl>
+                </p:cond>
+              </p:prevCondLst>
+              <p:nextCondLst>
+                <p:cond evt="onNext" delay="0">
+                  <p:tgtEl>
+                    <p:sldTgt/>
+                  </p:tgtEl>
+                </p:cond>
+              </p:nextCondLst>
+            </p:seq>
+          </p:childTnLst>
+        </p:cTn>
+      </p:par>
+    </p:tnLst>
+    <p:bldLst>
+      <p:bldP spid="5" grpId="0"/>
+    </p:bldLst>
+  </p:timing>
+</p:sld>
+</file>
+
+<file path=ppt/slides/slide12.xml><?xml version="1.0" encoding="utf-8"?>
+<p:sld xmlns:a="http://schemas.openxmlformats.org/drawingml/2006/main" xmlns:r="http://schemas.openxmlformats.org/officeDocument/2006/relationships" xmlns:p="http://schemas.openxmlformats.org/presentationml/2006/main">
+  <p:cSld>
+    <p:spTree>
+      <p:nvGrpSpPr>
+        <p:cNvPr id="1" name=""/>
+        <p:cNvGrpSpPr/>
+        <p:nvPr/>
+      </p:nvGrpSpPr>
+      <p:grpSpPr>
+        <a:xfrm>
+          <a:off x="0" y="0"/>
+          <a:ext cx="0" cy="0"/>
+          <a:chOff x="0" y="0"/>
+          <a:chExt cx="0" cy="0"/>
+        </a:xfrm>
+      </p:grpSpPr>
+      <p:pic>
+        <p:nvPicPr>
+          <p:cNvPr id="9" name="Picture Placeholder 8" descr="A group of fruits and vegetables&#10;&#10;Description automatically generated">
+            <a:extLst>
+              <a:ext uri="{FF2B5EF4-FFF2-40B4-BE49-F238E27FC236}">
+                <a16:creationId xmlns:a16="http://schemas.microsoft.com/office/drawing/2014/main" id="{566F1E99-3F75-AFCF-568C-89EBD77160D5}"/>
+              </a:ext>
+            </a:extLst>
+          </p:cNvPr>
+          <p:cNvPicPr>
+            <a:picLocks noGrp="1" noChangeAspect="1"/>
+          </p:cNvPicPr>
+          <p:nvPr>
+            <p:ph type="pic" sz="quarter" idx="12"/>
+          </p:nvPr>
+        </p:nvPicPr>
+        <p:blipFill>
+          <a:blip r:embed="rId2"/>
+          <a:srcRect t="32" b="32"/>
+          <a:stretch>
+            <a:fillRect/>
+          </a:stretch>
+        </p:blipFill>
+        <p:spPr/>
+      </p:pic>
+      <p:sp>
+        <p:nvSpPr>
+          <p:cNvPr id="45" name="직사각형 44">
+            <a:extLst>
+              <a:ext uri="{FF2B5EF4-FFF2-40B4-BE49-F238E27FC236}">
+                <a16:creationId xmlns:a16="http://schemas.microsoft.com/office/drawing/2014/main" id="{BBF6209E-429C-26A9-0851-E980B7171294}"/>
+              </a:ext>
+            </a:extLst>
+          </p:cNvPr>
+          <p:cNvSpPr/>
+          <p:nvPr/>
+        </p:nvSpPr>
+        <p:spPr>
+          <a:xfrm>
+            <a:off x="0" y="0"/>
+            <a:ext cx="6847203" cy="6858001"/>
+          </a:xfrm>
+          <a:prstGeom prst="rect">
+            <a:avLst/>
+          </a:prstGeom>
+          <a:solidFill>
+            <a:schemeClr val="tx1">
+              <a:alpha val="72138"/>
+            </a:schemeClr>
+          </a:solidFill>
+          <a:ln>
+            <a:noFill/>
+          </a:ln>
+        </p:spPr>
+        <p:style>
+          <a:lnRef idx="2">
+            <a:schemeClr val="accent1">
+              <a:shade val="50000"/>
+            </a:schemeClr>
+          </a:lnRef>
+          <a:fillRef idx="1">
+            <a:schemeClr val="accent1"/>
+          </a:fillRef>
+          <a:effectRef idx="0">
+            <a:schemeClr val="accent1"/>
+          </a:effectRef>
+          <a:fontRef idx="minor">
+            <a:schemeClr val="lt1"/>
+          </a:fontRef>
+        </p:style>
+        <p:txBody>
+          <a:bodyPr rtlCol="0" anchor="ctr"/>
+          <a:lstStyle/>
+          <a:p>
+            <a:pPr algn="ctr"/>
+            <a:endParaRPr kumimoji="1" lang="ko-Kore-KR" altLang="en-US" dirty="0"/>
+          </a:p>
+        </p:txBody>
+      </p:sp>
+      <p:sp>
+        <p:nvSpPr>
+          <p:cNvPr id="32" name="TextBox 31">
+            <a:extLst>
+              <a:ext uri="{FF2B5EF4-FFF2-40B4-BE49-F238E27FC236}">
+                <a16:creationId xmlns:a16="http://schemas.microsoft.com/office/drawing/2014/main" id="{861E899C-DC15-EF83-9743-91BBB16D90D0}"/>
+              </a:ext>
+            </a:extLst>
+          </p:cNvPr>
+          <p:cNvSpPr txBox="1"/>
+          <p:nvPr/>
+        </p:nvSpPr>
+        <p:spPr>
+          <a:xfrm>
+            <a:off x="719906" y="1885897"/>
+            <a:ext cx="9558091" cy="2800767"/>
+          </a:xfrm>
+          <a:prstGeom prst="rect">
+            <a:avLst/>
+          </a:prstGeom>
+          <a:noFill/>
+        </p:spPr>
+        <p:txBody>
+          <a:bodyPr wrap="square" rtlCol="0">
+            <a:spAutoFit/>
+          </a:bodyPr>
+          <a:lstStyle>
+            <a:defPPr>
+              <a:defRPr lang="ko-KR"/>
+            </a:defPPr>
+            <a:lvl1pPr>
+              <a:defRPr sz="4400" b="0" spc="-150">
+                <a:latin typeface="+mj-lt"/>
+              </a:defRPr>
+            </a:lvl1pPr>
+          </a:lstStyle>
+          <a:p>
+            <a:r>
+              <a:rPr lang="en-US" altLang="ko-KR" sz="8800" b="1" spc="0" dirty="0">
+                <a:solidFill>
+                  <a:schemeClr val="bg1"/>
+                </a:solidFill>
+                <a:effectLst>
+                  <a:outerShdw blurRad="38100" dist="38100" dir="2700000" algn="tl">
+                    <a:srgbClr val="000000">
+                      <a:alpha val="43137"/>
+                    </a:srgbClr>
+                  </a:outerShdw>
+                </a:effectLst>
+                <a:latin typeface="Noto Sans" panose="020B0502040504020204" pitchFamily="34" charset="0"/>
+                <a:ea typeface="Noto Sans" panose="020B0502040504020204" pitchFamily="34" charset="0"/>
+                <a:cs typeface="Noto Sans" panose="020B0502040504020204" pitchFamily="34" charset="0"/>
+              </a:rPr>
+              <a:t>Thank </a:t>
+            </a:r>
+          </a:p>
+          <a:p>
+            <a:r>
+              <a:rPr lang="en-US" altLang="ko-KR" sz="8800" b="1" spc="0" dirty="0">
+                <a:solidFill>
+                  <a:schemeClr val="bg1"/>
+                </a:solidFill>
+                <a:effectLst>
+                  <a:outerShdw blurRad="38100" dist="38100" dir="2700000" algn="tl">
+                    <a:srgbClr val="000000">
+                      <a:alpha val="43137"/>
+                    </a:srgbClr>
+                  </a:outerShdw>
+                </a:effectLst>
+                <a:latin typeface="Noto Sans" panose="020B0502040504020204" pitchFamily="34" charset="0"/>
+                <a:ea typeface="Noto Sans" panose="020B0502040504020204" pitchFamily="34" charset="0"/>
+                <a:cs typeface="Noto Sans" panose="020B0502040504020204" pitchFamily="34" charset="0"/>
+              </a:rPr>
+              <a:t>You</a:t>
+            </a:r>
+            <a:endParaRPr lang="ko-KR" altLang="en-US" sz="4800" spc="0" dirty="0">
+              <a:solidFill>
+                <a:schemeClr val="bg1"/>
+              </a:solidFill>
+              <a:latin typeface="Noto Sans" panose="020B0502040504020204" pitchFamily="34" charset="0"/>
+              <a:cs typeface="Noto Sans" panose="020B0502040504020204" pitchFamily="34" charset="0"/>
+            </a:endParaRPr>
+          </a:p>
+        </p:txBody>
+      </p:sp>
+      <p:sp>
+        <p:nvSpPr>
+          <p:cNvPr id="2" name="TextBox 1">
+            <a:extLst>
+              <a:ext uri="{FF2B5EF4-FFF2-40B4-BE49-F238E27FC236}">
+                <a16:creationId xmlns:a16="http://schemas.microsoft.com/office/drawing/2014/main" id="{8415540C-CAA5-C06A-1537-F8F8443E58A3}"/>
+              </a:ext>
+            </a:extLst>
+          </p:cNvPr>
+          <p:cNvSpPr txBox="1"/>
+          <p:nvPr/>
+        </p:nvSpPr>
+        <p:spPr>
+          <a:xfrm>
+            <a:off x="873839" y="4686664"/>
+            <a:ext cx="4771888" cy="461665"/>
+          </a:xfrm>
+          <a:prstGeom prst="rect">
+            <a:avLst/>
+          </a:prstGeom>
+          <a:noFill/>
+        </p:spPr>
+        <p:txBody>
+          <a:bodyPr wrap="square" rtlCol="0">
+            <a:spAutoFit/>
+          </a:bodyPr>
+          <a:lstStyle>
+            <a:defPPr>
+              <a:defRPr lang="ko-KR"/>
+            </a:defPPr>
+            <a:lvl1pPr>
+              <a:lnSpc>
+                <a:spcPct val="150000"/>
+              </a:lnSpc>
+              <a:defRPr sz="1400">
+                <a:solidFill>
+                  <a:schemeClr val="accent2"/>
+                </a:solidFill>
+              </a:defRPr>
+            </a:lvl1pPr>
+          </a:lstStyle>
+          <a:p>
+            <a:pPr>
+              <a:lnSpc>
+                <a:spcPct val="100000"/>
+              </a:lnSpc>
+            </a:pPr>
+            <a:r>
+              <a:rPr lang="pt-BR" altLang="ko-KR" sz="2400" b="1" spc="300" dirty="0">
+                <a:solidFill>
+                  <a:schemeClr val="bg1"/>
+                </a:solidFill>
+              </a:rPr>
+              <a:t>See You Soon</a:t>
+            </a:r>
+          </a:p>
+        </p:txBody>
+      </p:sp>
+    </p:spTree>
+    <p:extLst>
+      <p:ext uri="{BB962C8B-B14F-4D97-AF65-F5344CB8AC3E}">
+        <p14:creationId xmlns:p14="http://schemas.microsoft.com/office/powerpoint/2010/main" val="130725385"/>
+      </p:ext>
+    </p:extLst>
+  </p:cSld>
+  <p:clrMapOvr>
+    <a:masterClrMapping/>
+  </p:clrMapOvr>
+  <mc:AlternateContent xmlns:mc="http://schemas.openxmlformats.org/markup-compatibility/2006">
+    <mc:Choice xmlns:p159="http://schemas.microsoft.com/office/powerpoint/2015/09/main" Requires="p159">
+      <p:transition xmlns:p14="http://schemas.microsoft.com/office/powerpoint/2010/main" spd="slow" p14:dur="2000">
+        <p159:morph option="byObject"/>
+      </p:transition>
+    </mc:Choice>
+    <mc:Fallback>
+      <p:transition spd="slow">
+        <p:fade/>
+      </p:transition>
+    </mc:Fallback>
+  </mc:AlternateContent>
+</p:sld>
+</file>
+
+<file path=ppt/slides/slide13.xml><?xml version="1.0" encoding="utf-8"?>
+<p:sld xmlns:a="http://schemas.openxmlformats.org/drawingml/2006/main" xmlns:r="http://schemas.openxmlformats.org/officeDocument/2006/relationships" xmlns:p="http://schemas.openxmlformats.org/presentationml/2006/main">
+  <p:cSld>
+    <p:spTree>
+      <p:nvGrpSpPr>
+        <p:cNvPr id="1" name=""/>
+        <p:cNvGrpSpPr/>
+        <p:nvPr/>
+      </p:nvGrpSpPr>
+      <p:grpSpPr>
+        <a:xfrm>
+          <a:off x="0" y="0"/>
+          <a:ext cx="0" cy="0"/>
+          <a:chOff x="0" y="0"/>
+          <a:chExt cx="0" cy="0"/>
+        </a:xfrm>
+      </p:grpSpPr>
+      <p:pic>
+        <p:nvPicPr>
+          <p:cNvPr id="9" name="Picture Placeholder 8" descr="A group of fruits and vegetables&#10;&#10;Description automatically generated">
+            <a:extLst>
+              <a:ext uri="{FF2B5EF4-FFF2-40B4-BE49-F238E27FC236}">
+                <a16:creationId xmlns:a16="http://schemas.microsoft.com/office/drawing/2014/main" id="{566F1E99-3F75-AFCF-568C-89EBD77160D5}"/>
+              </a:ext>
+            </a:extLst>
+          </p:cNvPr>
+          <p:cNvPicPr>
+            <a:picLocks noGrp="1" noChangeAspect="1"/>
+          </p:cNvPicPr>
+          <p:nvPr>
+            <p:ph type="pic" sz="quarter" idx="12"/>
+          </p:nvPr>
+        </p:nvPicPr>
+        <p:blipFill>
+          <a:blip r:embed="rId2"/>
+          <a:srcRect t="32" b="32"/>
+          <a:stretch>
+            <a:fillRect/>
+          </a:stretch>
+        </p:blipFill>
+        <p:spPr/>
+      </p:pic>
+      <p:sp>
+        <p:nvSpPr>
+          <p:cNvPr id="45" name="직사각형 44">
+            <a:extLst>
+              <a:ext uri="{FF2B5EF4-FFF2-40B4-BE49-F238E27FC236}">
+                <a16:creationId xmlns:a16="http://schemas.microsoft.com/office/drawing/2014/main" id="{BBF6209E-429C-26A9-0851-E980B7171294}"/>
+              </a:ext>
+            </a:extLst>
+          </p:cNvPr>
+          <p:cNvSpPr/>
+          <p:nvPr/>
+        </p:nvSpPr>
+        <p:spPr>
+          <a:xfrm>
+            <a:off x="0" y="0"/>
+            <a:ext cx="12192000" cy="6858001"/>
+          </a:xfrm>
+          <a:prstGeom prst="rect">
+            <a:avLst/>
+          </a:prstGeom>
+          <a:solidFill>
+            <a:schemeClr val="tx1"/>
+          </a:solidFill>
+          <a:ln>
+            <a:noFill/>
+          </a:ln>
+        </p:spPr>
+        <p:style>
+          <a:lnRef idx="2">
+            <a:schemeClr val="accent1">
+              <a:shade val="50000"/>
+            </a:schemeClr>
+          </a:lnRef>
+          <a:fillRef idx="1">
+            <a:schemeClr val="accent1"/>
+          </a:fillRef>
+          <a:effectRef idx="0">
+            <a:schemeClr val="accent1"/>
+          </a:effectRef>
+          <a:fontRef idx="minor">
+            <a:schemeClr val="lt1"/>
+          </a:fontRef>
+        </p:style>
+        <p:txBody>
+          <a:bodyPr rtlCol="0" anchor="ctr"/>
+          <a:lstStyle/>
+          <a:p>
+            <a:pPr algn="ctr"/>
+            <a:endParaRPr kumimoji="1" lang="ko-Kore-KR" altLang="en-US" dirty="0"/>
+          </a:p>
+        </p:txBody>
+      </p:sp>
+    </p:spTree>
+    <p:extLst>
+      <p:ext uri="{BB962C8B-B14F-4D97-AF65-F5344CB8AC3E}">
+        <p14:creationId xmlns:p14="http://schemas.microsoft.com/office/powerpoint/2010/main" val="2986285981"/>
+      </p:ext>
+    </p:extLst>
+  </p:cSld>
+  <p:clrMapOvr>
+    <a:masterClrMapping/>
+  </p:clrMapOvr>
+  <mc:AlternateContent xmlns:mc="http://schemas.openxmlformats.org/markup-compatibility/2006">
+    <mc:Choice xmlns:p159="http://schemas.microsoft.com/office/powerpoint/2015/09/main" Requires="p159">
+      <p:transition xmlns:p14="http://schemas.microsoft.com/office/powerpoint/2010/main" spd="slow" p14:dur="1500">
+        <p159:morph option="byObject"/>
+      </p:transition>
+    </mc:Choice>
+    <mc:Fallback>
+      <p:transition spd="slow">
         <p:fade/>
       </p:transition>
     </mc:Fallback>

</xml_diff>